<commit_message>
scratch notes for now
</commit_message>
<xml_diff>
--- a/Deployment/docs/Secure-Rest-Api-App.pptx
+++ b/Deployment/docs/Secure-Rest-Api-App.pptx
@@ -167,6 +167,54 @@
     </pc:docChg>
   </pc:docChgLst>
   <pc:docChgLst>
+    <pc:chgData name="Gaiye Zhou" userId="57624dc8-72d9-4103-85d2-3bb69491f2d7" providerId="ADAL" clId="{EE97EEA1-D438-4B58-A4A1-97DEE8318B2A}"/>
+    <pc:docChg chg="undo custSel modSld">
+      <pc:chgData name="Gaiye Zhou" userId="57624dc8-72d9-4103-85d2-3bb69491f2d7" providerId="ADAL" clId="{EE97EEA1-D438-4B58-A4A1-97DEE8318B2A}" dt="2025-01-10T20:14:00.474" v="125" actId="1076"/>
+      <pc:docMkLst>
+        <pc:docMk/>
+      </pc:docMkLst>
+      <pc:sldChg chg="addSp delSp modSp mod">
+        <pc:chgData name="Gaiye Zhou" userId="57624dc8-72d9-4103-85d2-3bb69491f2d7" providerId="ADAL" clId="{EE97EEA1-D438-4B58-A4A1-97DEE8318B2A}" dt="2025-01-10T20:14:00.474" v="125" actId="1076"/>
+        <pc:sldMkLst>
+          <pc:docMk/>
+          <pc:sldMk cId="712083684" sldId="2147470321"/>
+        </pc:sldMkLst>
+        <pc:spChg chg="mod">
+          <ac:chgData name="Gaiye Zhou" userId="57624dc8-72d9-4103-85d2-3bb69491f2d7" providerId="ADAL" clId="{EE97EEA1-D438-4B58-A4A1-97DEE8318B2A}" dt="2025-01-10T20:14:00.474" v="125" actId="1076"/>
+          <ac:spMkLst>
+            <pc:docMk/>
+            <pc:sldMk cId="712083684" sldId="2147470321"/>
+            <ac:spMk id="48" creationId="{0C10245E-BD5F-07FF-724A-0E332820C4D3}"/>
+          </ac:spMkLst>
+        </pc:spChg>
+        <pc:picChg chg="add mod">
+          <ac:chgData name="Gaiye Zhou" userId="57624dc8-72d9-4103-85d2-3bb69491f2d7" providerId="ADAL" clId="{EE97EEA1-D438-4B58-A4A1-97DEE8318B2A}" dt="2025-01-10T20:13:56.346" v="124" actId="1076"/>
+          <ac:picMkLst>
+            <pc:docMk/>
+            <pc:sldMk cId="712083684" sldId="2147470321"/>
+            <ac:picMk id="32" creationId="{6F02CF25-89B0-2752-DE8C-9BCE15A5F548}"/>
+          </ac:picMkLst>
+        </pc:picChg>
+      </pc:sldChg>
+    </pc:docChg>
+  </pc:docChgLst>
+  <pc:docChgLst>
+    <pc:chgData name="Brandon Cowen" userId="S::brandoncowen@microsoft.com::4a3d2f45-d458-4af1-9194-9e74c349f437" providerId="AD" clId="Web-{E00216F6-2701-1CCF-AFBC-74B8569FF3F1}"/>
+    <pc:docChg chg="modSld">
+      <pc:chgData name="Brandon Cowen" userId="S::brandoncowen@microsoft.com::4a3d2f45-d458-4af1-9194-9e74c349f437" providerId="AD" clId="Web-{E00216F6-2701-1CCF-AFBC-74B8569FF3F1}" dt="2023-02-08T17:12:48.859" v="16" actId="20577"/>
+      <pc:docMkLst>
+        <pc:docMk/>
+      </pc:docMkLst>
+      <pc:sldChg chg="addSp delSp modSp">
+        <pc:chgData name="Brandon Cowen" userId="S::brandoncowen@microsoft.com::4a3d2f45-d458-4af1-9194-9e74c349f437" providerId="AD" clId="Web-{E00216F6-2701-1CCF-AFBC-74B8569FF3F1}" dt="2023-02-08T17:12:48.859" v="16" actId="20577"/>
+        <pc:sldMkLst>
+          <pc:docMk/>
+          <pc:sldMk cId="2973216957" sldId="2147470318"/>
+        </pc:sldMkLst>
+      </pc:sldChg>
+    </pc:docChg>
+  </pc:docChgLst>
+  <pc:docChgLst>
     <pc:chgData name="Paweena Tongbai (Lionbridge Technologies Inc)" userId="2b9f2c3d-e641-4e58-85cf-3fb104de0a4b" providerId="ADAL" clId="{0CE08B44-E304-4FD9-B502-F30468332638}"/>
     <pc:docChg chg="undo custSel addSld delSld modSld">
       <pc:chgData name="Paweena Tongbai (Lionbridge Technologies Inc)" userId="2b9f2c3d-e641-4e58-85cf-3fb104de0a4b" providerId="ADAL" clId="{0CE08B44-E304-4FD9-B502-F30468332638}" dt="2023-03-11T01:10:43.946" v="321" actId="12788"/>
@@ -200,54 +248,6 @@
           <pc:docMk/>
           <pc:sldMk cId="3662562578" sldId="2147470321"/>
         </pc:sldMkLst>
-      </pc:sldChg>
-    </pc:docChg>
-  </pc:docChgLst>
-  <pc:docChgLst>
-    <pc:chgData name="Brandon Cowen" userId="S::brandoncowen@microsoft.com::4a3d2f45-d458-4af1-9194-9e74c349f437" providerId="AD" clId="Web-{E00216F6-2701-1CCF-AFBC-74B8569FF3F1}"/>
-    <pc:docChg chg="modSld">
-      <pc:chgData name="Brandon Cowen" userId="S::brandoncowen@microsoft.com::4a3d2f45-d458-4af1-9194-9e74c349f437" providerId="AD" clId="Web-{E00216F6-2701-1CCF-AFBC-74B8569FF3F1}" dt="2023-02-08T17:12:48.859" v="16" actId="20577"/>
-      <pc:docMkLst>
-        <pc:docMk/>
-      </pc:docMkLst>
-      <pc:sldChg chg="addSp delSp modSp">
-        <pc:chgData name="Brandon Cowen" userId="S::brandoncowen@microsoft.com::4a3d2f45-d458-4af1-9194-9e74c349f437" providerId="AD" clId="Web-{E00216F6-2701-1CCF-AFBC-74B8569FF3F1}" dt="2023-02-08T17:12:48.859" v="16" actId="20577"/>
-        <pc:sldMkLst>
-          <pc:docMk/>
-          <pc:sldMk cId="2973216957" sldId="2147470318"/>
-        </pc:sldMkLst>
-      </pc:sldChg>
-    </pc:docChg>
-  </pc:docChgLst>
-  <pc:docChgLst>
-    <pc:chgData name="Gaiye Zhou" userId="57624dc8-72d9-4103-85d2-3bb69491f2d7" providerId="ADAL" clId="{EE97EEA1-D438-4B58-A4A1-97DEE8318B2A}"/>
-    <pc:docChg chg="undo custSel modSld">
-      <pc:chgData name="Gaiye Zhou" userId="57624dc8-72d9-4103-85d2-3bb69491f2d7" providerId="ADAL" clId="{EE97EEA1-D438-4B58-A4A1-97DEE8318B2A}" dt="2025-01-10T20:14:00.474" v="125" actId="1076"/>
-      <pc:docMkLst>
-        <pc:docMk/>
-      </pc:docMkLst>
-      <pc:sldChg chg="addSp delSp modSp mod">
-        <pc:chgData name="Gaiye Zhou" userId="57624dc8-72d9-4103-85d2-3bb69491f2d7" providerId="ADAL" clId="{EE97EEA1-D438-4B58-A4A1-97DEE8318B2A}" dt="2025-01-10T20:14:00.474" v="125" actId="1076"/>
-        <pc:sldMkLst>
-          <pc:docMk/>
-          <pc:sldMk cId="712083684" sldId="2147470321"/>
-        </pc:sldMkLst>
-        <pc:spChg chg="mod">
-          <ac:chgData name="Gaiye Zhou" userId="57624dc8-72d9-4103-85d2-3bb69491f2d7" providerId="ADAL" clId="{EE97EEA1-D438-4B58-A4A1-97DEE8318B2A}" dt="2025-01-10T20:14:00.474" v="125" actId="1076"/>
-          <ac:spMkLst>
-            <pc:docMk/>
-            <pc:sldMk cId="712083684" sldId="2147470321"/>
-            <ac:spMk id="48" creationId="{0C10245E-BD5F-07FF-724A-0E332820C4D3}"/>
-          </ac:spMkLst>
-        </pc:spChg>
-        <pc:picChg chg="add mod">
-          <ac:chgData name="Gaiye Zhou" userId="57624dc8-72d9-4103-85d2-3bb69491f2d7" providerId="ADAL" clId="{EE97EEA1-D438-4B58-A4A1-97DEE8318B2A}" dt="2025-01-10T20:13:56.346" v="124" actId="1076"/>
-          <ac:picMkLst>
-            <pc:docMk/>
-            <pc:sldMk cId="712083684" sldId="2147470321"/>
-            <ac:picMk id="32" creationId="{6F02CF25-89B0-2752-DE8C-9BCE15A5F548}"/>
-          </ac:picMkLst>
-        </pc:picChg>
       </pc:sldChg>
     </pc:docChg>
   </pc:docChgLst>
@@ -814,7 +814,7 @@
           <a:p>
             <a:fld id="{F75D224A-AA7B-4AF2-B78F-AE8C19643E75}" type="datetimeFigureOut">
               <a:rPr lang="en-US" smtClean="0"/>
-              <a:t>2/27/2025</a:t>
+              <a:t>2/28/2025</a:t>
             </a:fld>
             <a:endParaRPr lang="en-US"/>
           </a:p>
@@ -1312,7 +1312,7 @@
           <a:p>
             <a:fld id="{622D8DFC-99A5-483F-9E79-FE8D6FEFD48F}" type="datetimeFigureOut">
               <a:rPr lang="en-US" smtClean="0"/>
-              <a:t>2/27/2025</a:t>
+              <a:t>2/28/2025</a:t>
             </a:fld>
             <a:endParaRPr lang="en-US"/>
           </a:p>
@@ -1510,7 +1510,7 @@
           <a:p>
             <a:fld id="{622D8DFC-99A5-483F-9E79-FE8D6FEFD48F}" type="datetimeFigureOut">
               <a:rPr lang="en-US" smtClean="0"/>
-              <a:t>2/27/2025</a:t>
+              <a:t>2/28/2025</a:t>
             </a:fld>
             <a:endParaRPr lang="en-US"/>
           </a:p>
@@ -1718,7 +1718,7 @@
           <a:p>
             <a:fld id="{622D8DFC-99A5-483F-9E79-FE8D6FEFD48F}" type="datetimeFigureOut">
               <a:rPr lang="en-US" smtClean="0"/>
-              <a:t>2/27/2025</a:t>
+              <a:t>2/28/2025</a:t>
             </a:fld>
             <a:endParaRPr lang="en-US"/>
           </a:p>
@@ -2171,7 +2171,7 @@
           <a:p>
             <a:fld id="{622D8DFC-99A5-483F-9E79-FE8D6FEFD48F}" type="datetimeFigureOut">
               <a:rPr lang="en-US" smtClean="0"/>
-              <a:t>2/27/2025</a:t>
+              <a:t>2/28/2025</a:t>
             </a:fld>
             <a:endParaRPr lang="en-US"/>
           </a:p>
@@ -2446,7 +2446,7 @@
           <a:p>
             <a:fld id="{622D8DFC-99A5-483F-9E79-FE8D6FEFD48F}" type="datetimeFigureOut">
               <a:rPr lang="en-US" smtClean="0"/>
-              <a:t>2/27/2025</a:t>
+              <a:t>2/28/2025</a:t>
             </a:fld>
             <a:endParaRPr lang="en-US"/>
           </a:p>
@@ -2711,7 +2711,7 @@
           <a:p>
             <a:fld id="{622D8DFC-99A5-483F-9E79-FE8D6FEFD48F}" type="datetimeFigureOut">
               <a:rPr lang="en-US" smtClean="0"/>
-              <a:t>2/27/2025</a:t>
+              <a:t>2/28/2025</a:t>
             </a:fld>
             <a:endParaRPr lang="en-US"/>
           </a:p>
@@ -3123,7 +3123,7 @@
           <a:p>
             <a:fld id="{622D8DFC-99A5-483F-9E79-FE8D6FEFD48F}" type="datetimeFigureOut">
               <a:rPr lang="en-US" smtClean="0"/>
-              <a:t>2/27/2025</a:t>
+              <a:t>2/28/2025</a:t>
             </a:fld>
             <a:endParaRPr lang="en-US"/>
           </a:p>
@@ -3264,7 +3264,7 @@
           <a:p>
             <a:fld id="{622D8DFC-99A5-483F-9E79-FE8D6FEFD48F}" type="datetimeFigureOut">
               <a:rPr lang="en-US" smtClean="0"/>
-              <a:t>2/27/2025</a:t>
+              <a:t>2/28/2025</a:t>
             </a:fld>
             <a:endParaRPr lang="en-US"/>
           </a:p>
@@ -3377,7 +3377,7 @@
           <a:p>
             <a:fld id="{622D8DFC-99A5-483F-9E79-FE8D6FEFD48F}" type="datetimeFigureOut">
               <a:rPr lang="en-US" smtClean="0"/>
-              <a:t>2/27/2025</a:t>
+              <a:t>2/28/2025</a:t>
             </a:fld>
             <a:endParaRPr lang="en-US"/>
           </a:p>
@@ -3688,7 +3688,7 @@
           <a:p>
             <a:fld id="{622D8DFC-99A5-483F-9E79-FE8D6FEFD48F}" type="datetimeFigureOut">
               <a:rPr lang="en-US" smtClean="0"/>
-              <a:t>2/27/2025</a:t>
+              <a:t>2/28/2025</a:t>
             </a:fld>
             <a:endParaRPr lang="en-US"/>
           </a:p>
@@ -3976,7 +3976,7 @@
           <a:p>
             <a:fld id="{622D8DFC-99A5-483F-9E79-FE8D6FEFD48F}" type="datetimeFigureOut">
               <a:rPr lang="en-US" smtClean="0"/>
-              <a:t>2/27/2025</a:t>
+              <a:t>2/28/2025</a:t>
             </a:fld>
             <a:endParaRPr lang="en-US"/>
           </a:p>
@@ -4217,7 +4217,7 @@
           <a:p>
             <a:fld id="{622D8DFC-99A5-483F-9E79-FE8D6FEFD48F}" type="datetimeFigureOut">
               <a:rPr lang="en-US" smtClean="0"/>
-              <a:t>2/27/2025</a:t>
+              <a:t>2/28/2025</a:t>
             </a:fld>
             <a:endParaRPr lang="en-US"/>
           </a:p>
@@ -5051,42 +5051,6 @@
           </a:p>
         </p:txBody>
       </p:sp>
-      <p:pic>
-        <p:nvPicPr>
-          <p:cNvPr id="16" name="Picture 15" descr="A blue and white cloud logo&#10;&#10;AI-generated content may be incorrect.">
-            <a:extLst>
-              <a:ext uri="{FF2B5EF4-FFF2-40B4-BE49-F238E27FC236}">
-                <a16:creationId xmlns:a16="http://schemas.microsoft.com/office/drawing/2014/main" id="{26B15B76-3094-6654-D6C8-2C0784B47B9D}"/>
-              </a:ext>
-            </a:extLst>
-          </p:cNvPr>
-          <p:cNvPicPr>
-            <a:picLocks noChangeAspect="1"/>
-          </p:cNvPicPr>
-          <p:nvPr/>
-        </p:nvPicPr>
-        <p:blipFill>
-          <a:blip r:embed="rId5">
-            <a:extLst>
-              <a:ext uri="{28A0092B-C50C-407E-A947-70E740481C1C}">
-                <a14:useLocalDpi xmlns:a14="http://schemas.microsoft.com/office/drawing/2010/main" val="0"/>
-              </a:ext>
-            </a:extLst>
-          </a:blip>
-          <a:stretch>
-            <a:fillRect/>
-          </a:stretch>
-        </p:blipFill>
-        <p:spPr>
-          <a:xfrm>
-            <a:off x="4421347" y="1193253"/>
-            <a:ext cx="1520857" cy="1511350"/>
-          </a:xfrm>
-          <a:prstGeom prst="rect">
-            <a:avLst/>
-          </a:prstGeom>
-        </p:spPr>
-      </p:pic>
       <p:sp>
         <p:nvSpPr>
           <p:cNvPr id="18" name="Rectangle 17">
@@ -5217,14 +5181,14 @@
           <p:cNvCxnSpPr>
             <a:cxnSpLocks/>
             <a:stCxn id="20" idx="3"/>
-            <a:endCxn id="16" idx="1"/>
+            <a:endCxn id="6" idx="1"/>
           </p:cNvCxnSpPr>
           <p:nvPr/>
         </p:nvCxnSpPr>
         <p:spPr>
           <a:xfrm>
             <a:off x="2603796" y="1921462"/>
-            <a:ext cx="1817551" cy="27466"/>
+            <a:ext cx="1740028" cy="12250"/>
           </a:xfrm>
           <a:prstGeom prst="straightConnector1">
             <a:avLst/>
@@ -5313,47 +5277,6 @@
           </a:p>
         </p:txBody>
       </p:sp>
-      <p:cxnSp>
-        <p:nvCxnSpPr>
-          <p:cNvPr id="92" name="Straight Connector 91">
-            <a:extLst>
-              <a:ext uri="{FF2B5EF4-FFF2-40B4-BE49-F238E27FC236}">
-                <a16:creationId xmlns:a16="http://schemas.microsoft.com/office/drawing/2014/main" id="{E16323E5-C740-F0EE-E291-E75B26DCF7E5}"/>
-              </a:ext>
-            </a:extLst>
-          </p:cNvPr>
-          <p:cNvCxnSpPr>
-            <a:cxnSpLocks/>
-          </p:cNvCxnSpPr>
-          <p:nvPr/>
-        </p:nvCxnSpPr>
-        <p:spPr>
-          <a:xfrm>
-            <a:off x="5897261" y="2369873"/>
-            <a:ext cx="770877" cy="2670"/>
-          </a:xfrm>
-          <a:prstGeom prst="line">
-            <a:avLst/>
-          </a:prstGeom>
-          <a:ln w="25400">
-            <a:tailEnd w="lg" len="lg"/>
-          </a:ln>
-        </p:spPr>
-        <p:style>
-          <a:lnRef idx="1">
-            <a:schemeClr val="dk1"/>
-          </a:lnRef>
-          <a:fillRef idx="0">
-            <a:schemeClr val="dk1"/>
-          </a:fillRef>
-          <a:effectRef idx="0">
-            <a:schemeClr val="dk1"/>
-          </a:effectRef>
-          <a:fontRef idx="minor">
-            <a:schemeClr val="tx1"/>
-          </a:fontRef>
-        </p:style>
-      </p:cxnSp>
       <p:cxnSp>
         <p:nvCxnSpPr>
           <p:cNvPr id="95" name="Straight Connector 94">
@@ -5614,48 +5537,6 @@
       </p:cxnSp>
       <p:cxnSp>
         <p:nvCxnSpPr>
-          <p:cNvPr id="128" name="Straight Connector 127">
-            <a:extLst>
-              <a:ext uri="{FF2B5EF4-FFF2-40B4-BE49-F238E27FC236}">
-                <a16:creationId xmlns:a16="http://schemas.microsoft.com/office/drawing/2014/main" id="{CEBB8867-4C7E-C021-79A8-FAB35BE0DC88}"/>
-              </a:ext>
-            </a:extLst>
-          </p:cNvPr>
-          <p:cNvCxnSpPr>
-            <a:cxnSpLocks/>
-          </p:cNvCxnSpPr>
-          <p:nvPr/>
-        </p:nvCxnSpPr>
-        <p:spPr>
-          <a:xfrm>
-            <a:off x="5897261" y="1335178"/>
-            <a:ext cx="3338445" cy="5763"/>
-          </a:xfrm>
-          <a:prstGeom prst="line">
-            <a:avLst/>
-          </a:prstGeom>
-          <a:ln w="25400">
-            <a:prstDash val="sysDash"/>
-            <a:tailEnd w="lg" len="lg"/>
-          </a:ln>
-        </p:spPr>
-        <p:style>
-          <a:lnRef idx="1">
-            <a:schemeClr val="dk1"/>
-          </a:lnRef>
-          <a:fillRef idx="0">
-            <a:schemeClr val="dk1"/>
-          </a:fillRef>
-          <a:effectRef idx="0">
-            <a:schemeClr val="dk1"/>
-          </a:effectRef>
-          <a:fontRef idx="minor">
-            <a:schemeClr val="tx1"/>
-          </a:fontRef>
-        </p:style>
-      </p:cxnSp>
-      <p:cxnSp>
-        <p:nvCxnSpPr>
           <p:cNvPr id="131" name="Straight Connector 130">
             <a:extLst>
               <a:ext uri="{FF2B5EF4-FFF2-40B4-BE49-F238E27FC236}">
@@ -6158,7 +6039,7 @@
           <p:nvPr/>
         </p:nvPicPr>
         <p:blipFill>
-          <a:blip r:embed="rId6">
+          <a:blip r:embed="rId5">
             <a:extLst>
               <a:ext uri="{28A0092B-C50C-407E-A947-70E740481C1C}">
                 <a14:useLocalDpi xmlns:a14="http://schemas.microsoft.com/office/drawing/2010/main" val="0"/>
@@ -6179,51 +6060,6 @@
           </a:prstGeom>
         </p:spPr>
       </p:pic>
-      <p:cxnSp>
-        <p:nvCxnSpPr>
-          <p:cNvPr id="12" name="Straight Arrow Connector 11">
-            <a:extLst>
-              <a:ext uri="{FF2B5EF4-FFF2-40B4-BE49-F238E27FC236}">
-                <a16:creationId xmlns:a16="http://schemas.microsoft.com/office/drawing/2014/main" id="{BA590BC8-550A-0867-3FFF-FA018AA64EF0}"/>
-              </a:ext>
-            </a:extLst>
-          </p:cNvPr>
-          <p:cNvCxnSpPr>
-            <a:cxnSpLocks/>
-          </p:cNvCxnSpPr>
-          <p:nvPr/>
-        </p:nvCxnSpPr>
-        <p:spPr>
-          <a:xfrm flipH="1" flipV="1">
-            <a:off x="5897261" y="1774038"/>
-            <a:ext cx="1967776" cy="23367"/>
-          </a:xfrm>
-          <a:prstGeom prst="straightConnector1">
-            <a:avLst/>
-          </a:prstGeom>
-          <a:ln w="25400">
-            <a:solidFill>
-              <a:schemeClr val="tx1"/>
-            </a:solidFill>
-            <a:headEnd type="none" w="lg" len="med"/>
-            <a:tailEnd type="triangle" w="lg" len="lg"/>
-          </a:ln>
-        </p:spPr>
-        <p:style>
-          <a:lnRef idx="1">
-            <a:schemeClr val="accent6"/>
-          </a:lnRef>
-          <a:fillRef idx="0">
-            <a:schemeClr val="accent6"/>
-          </a:fillRef>
-          <a:effectRef idx="0">
-            <a:schemeClr val="accent6"/>
-          </a:effectRef>
-          <a:fontRef idx="minor">
-            <a:schemeClr val="tx1"/>
-          </a:fontRef>
-        </p:style>
-      </p:cxnSp>
       <p:pic>
         <p:nvPicPr>
           <p:cNvPr id="40" name="Picture 39" descr="A black and yellow lock with a key&#10;&#10;AI-generated content may be incorrect.">
@@ -6239,7 +6075,7 @@
           <p:nvPr/>
         </p:nvPicPr>
         <p:blipFill>
-          <a:blip r:embed="rId7">
+          <a:blip r:embed="rId6">
             <a:extLst>
               <a:ext uri="{28A0092B-C50C-407E-A947-70E740481C1C}">
                 <a14:useLocalDpi xmlns:a14="http://schemas.microsoft.com/office/drawing/2010/main" val="0"/>
@@ -6553,7 +6389,7 @@
           <p:nvPr/>
         </p:nvPicPr>
         <p:blipFill>
-          <a:blip r:embed="rId8">
+          <a:blip r:embed="rId7">
             <a:extLst>
               <a:ext uri="{28A0092B-C50C-407E-A947-70E740481C1C}">
                 <a14:useLocalDpi xmlns:a14="http://schemas.microsoft.com/office/drawing/2010/main" val="0"/>
@@ -6574,6 +6410,164 @@
           </a:prstGeom>
         </p:spPr>
       </p:pic>
+      <p:pic>
+        <p:nvPicPr>
+          <p:cNvPr id="6" name="Picture 5">
+            <a:extLst>
+              <a:ext uri="{FF2B5EF4-FFF2-40B4-BE49-F238E27FC236}">
+                <a16:creationId xmlns:a16="http://schemas.microsoft.com/office/drawing/2014/main" id="{36C26002-9132-57F3-03BE-D9F9A14360E8}"/>
+              </a:ext>
+            </a:extLst>
+          </p:cNvPr>
+          <p:cNvPicPr>
+            <a:picLocks noChangeAspect="1"/>
+          </p:cNvPicPr>
+          <p:nvPr/>
+        </p:nvPicPr>
+        <p:blipFill>
+          <a:blip r:embed="rId8"/>
+          <a:stretch>
+            <a:fillRect/>
+          </a:stretch>
+        </p:blipFill>
+        <p:spPr>
+          <a:xfrm>
+            <a:off x="4343824" y="1232457"/>
+            <a:ext cx="1539685" cy="1402509"/>
+          </a:xfrm>
+          <a:prstGeom prst="rect">
+            <a:avLst/>
+          </a:prstGeom>
+        </p:spPr>
+      </p:pic>
+      <p:cxnSp>
+        <p:nvCxnSpPr>
+          <p:cNvPr id="92" name="Straight Connector 91">
+            <a:extLst>
+              <a:ext uri="{FF2B5EF4-FFF2-40B4-BE49-F238E27FC236}">
+                <a16:creationId xmlns:a16="http://schemas.microsoft.com/office/drawing/2014/main" id="{E16323E5-C740-F0EE-E291-E75B26DCF7E5}"/>
+              </a:ext>
+            </a:extLst>
+          </p:cNvPr>
+          <p:cNvCxnSpPr>
+            <a:cxnSpLocks/>
+          </p:cNvCxnSpPr>
+          <p:nvPr/>
+        </p:nvCxnSpPr>
+        <p:spPr>
+          <a:xfrm flipV="1">
+            <a:off x="5669280" y="2372543"/>
+            <a:ext cx="998858" cy="8150"/>
+          </a:xfrm>
+          <a:prstGeom prst="line">
+            <a:avLst/>
+          </a:prstGeom>
+          <a:ln w="25400">
+            <a:tailEnd w="lg" len="lg"/>
+          </a:ln>
+        </p:spPr>
+        <p:style>
+          <a:lnRef idx="1">
+            <a:schemeClr val="dk1"/>
+          </a:lnRef>
+          <a:fillRef idx="0">
+            <a:schemeClr val="dk1"/>
+          </a:fillRef>
+          <a:effectRef idx="0">
+            <a:schemeClr val="dk1"/>
+          </a:effectRef>
+          <a:fontRef idx="minor">
+            <a:schemeClr val="tx1"/>
+          </a:fontRef>
+        </p:style>
+      </p:cxnSp>
+      <p:cxnSp>
+        <p:nvCxnSpPr>
+          <p:cNvPr id="128" name="Straight Connector 127">
+            <a:extLst>
+              <a:ext uri="{FF2B5EF4-FFF2-40B4-BE49-F238E27FC236}">
+                <a16:creationId xmlns:a16="http://schemas.microsoft.com/office/drawing/2014/main" id="{CEBB8867-4C7E-C021-79A8-FAB35BE0DC88}"/>
+              </a:ext>
+            </a:extLst>
+          </p:cNvPr>
+          <p:cNvCxnSpPr>
+            <a:cxnSpLocks/>
+          </p:cNvCxnSpPr>
+          <p:nvPr/>
+        </p:nvCxnSpPr>
+        <p:spPr>
+          <a:xfrm>
+            <a:off x="5669280" y="1310626"/>
+            <a:ext cx="3566426" cy="30315"/>
+          </a:xfrm>
+          <a:prstGeom prst="line">
+            <a:avLst/>
+          </a:prstGeom>
+          <a:ln w="25400">
+            <a:prstDash val="sysDash"/>
+            <a:tailEnd w="lg" len="lg"/>
+          </a:ln>
+        </p:spPr>
+        <p:style>
+          <a:lnRef idx="1">
+            <a:schemeClr val="dk1"/>
+          </a:lnRef>
+          <a:fillRef idx="0">
+            <a:schemeClr val="dk1"/>
+          </a:fillRef>
+          <a:effectRef idx="0">
+            <a:schemeClr val="dk1"/>
+          </a:effectRef>
+          <a:fontRef idx="minor">
+            <a:schemeClr val="tx1"/>
+          </a:fontRef>
+        </p:style>
+      </p:cxnSp>
+      <p:cxnSp>
+        <p:nvCxnSpPr>
+          <p:cNvPr id="12" name="Straight Arrow Connector 11">
+            <a:extLst>
+              <a:ext uri="{FF2B5EF4-FFF2-40B4-BE49-F238E27FC236}">
+                <a16:creationId xmlns:a16="http://schemas.microsoft.com/office/drawing/2014/main" id="{BA590BC8-550A-0867-3FFF-FA018AA64EF0}"/>
+              </a:ext>
+            </a:extLst>
+          </p:cNvPr>
+          <p:cNvCxnSpPr>
+            <a:cxnSpLocks/>
+          </p:cNvCxnSpPr>
+          <p:nvPr/>
+        </p:nvCxnSpPr>
+        <p:spPr>
+          <a:xfrm flipH="1" flipV="1">
+            <a:off x="5848185" y="1783894"/>
+            <a:ext cx="2016852" cy="13511"/>
+          </a:xfrm>
+          <a:prstGeom prst="straightConnector1">
+            <a:avLst/>
+          </a:prstGeom>
+          <a:ln w="25400">
+            <a:solidFill>
+              <a:schemeClr val="tx1"/>
+            </a:solidFill>
+            <a:headEnd type="none" w="lg" len="med"/>
+            <a:tailEnd type="triangle" w="lg" len="lg"/>
+          </a:ln>
+        </p:spPr>
+        <p:style>
+          <a:lnRef idx="1">
+            <a:schemeClr val="accent6"/>
+          </a:lnRef>
+          <a:fillRef idx="0">
+            <a:schemeClr val="accent6"/>
+          </a:fillRef>
+          <a:effectRef idx="0">
+            <a:schemeClr val="accent6"/>
+          </a:effectRef>
+          <a:fontRef idx="minor">
+            <a:schemeClr val="tx1"/>
+          </a:fontRef>
+        </p:style>
+      </p:cxnSp>
     </p:spTree>
     <p:extLst>
       <p:ext uri="{BB962C8B-B14F-4D97-AF65-F5344CB8AC3E}">
@@ -7178,6 +7172,15 @@
 </file>
 
 <file path=customXml/item1.xml><?xml version="1.0" encoding="utf-8"?>
+<?mso-contentType ?>
+<FormTemplates xmlns="http://schemas.microsoft.com/sharepoint/v3/contenttype/forms">
+  <Display>DocumentLibraryForm</Display>
+  <Edit>DocumentLibraryForm</Edit>
+  <New>DocumentLibraryForm</New>
+</FormTemplates>
+</file>
+
+<file path=customXml/item2.xml><?xml version="1.0" encoding="utf-8"?>
 <ct:contentTypeSchema xmlns:ct="http://schemas.microsoft.com/office/2006/metadata/contentType" xmlns:ma="http://schemas.microsoft.com/office/2006/metadata/properties/metaAttributes" ct:_="" ma:_="" ma:contentTypeName="Document" ma:contentTypeID="0x0101004393101A1DC9B14E920AEC1207759D8A" ma:contentTypeVersion="20" ma:contentTypeDescription="Create a new document." ma:contentTypeScope="" ma:versionID="0d181b5c4d9e98e75c568baa24c9ee5b">
   <xsd:schema xmlns:xsd="http://www.w3.org/2001/XMLSchema" xmlns:xs="http://www.w3.org/2001/XMLSchema" xmlns:p="http://schemas.microsoft.com/office/2006/metadata/properties" xmlns:ns1="http://schemas.microsoft.com/sharepoint/v3" xmlns:ns2="9d03ce06-685b-418c-8101-ca27946f3f9e" xmlns:ns3="230e9df3-be65-4c73-a93b-d1236ebd677e" xmlns:ns4="6c51fb8b-8e9e-424f-b446-9b2a950b0006" targetNamespace="http://schemas.microsoft.com/office/2006/metadata/properties" ma:root="true" ma:fieldsID="37e5b38d01238b6f015d30865e22ae3a" ns1:_="" ns2:_="" ns3:_="" ns4:_="">
     <xsd:import namespace="http://schemas.microsoft.com/sharepoint/v3"/>
@@ -7444,15 +7447,6 @@
 </ct:contentTypeSchema>
 </file>
 
-<file path=customXml/item2.xml><?xml version="1.0" encoding="utf-8"?>
-<?mso-contentType ?>
-<FormTemplates xmlns="http://schemas.microsoft.com/sharepoint/v3/contenttype/forms">
-  <Display>DocumentLibraryForm</Display>
-  <Edit>DocumentLibraryForm</Edit>
-  <New>DocumentLibraryForm</New>
-</FormTemplates>
-</file>
-
 <file path=customXml/item3.xml><?xml version="1.0" encoding="utf-8"?>
 <p:properties xmlns:p="http://schemas.microsoft.com/office/2006/metadata/properties" xmlns:xsi="http://www.w3.org/2001/XMLSchema-instance" xmlns:pc="http://schemas.microsoft.com/office/infopath/2007/PartnerControls">
   <documentManagement>
@@ -7468,6 +7462,14 @@
 </file>
 
 <file path=customXml/itemProps1.xml><?xml version="1.0" encoding="utf-8"?>
+<ds:datastoreItem xmlns:ds="http://schemas.openxmlformats.org/officeDocument/2006/customXml" ds:itemID="{113220A2-EEC3-42C6-B708-AF5124D23717}">
+  <ds:schemaRefs>
+    <ds:schemaRef ds:uri="http://schemas.microsoft.com/sharepoint/v3/contenttype/forms"/>
+  </ds:schemaRefs>
+</ds:datastoreItem>
+</file>
+
+<file path=customXml/itemProps2.xml><?xml version="1.0" encoding="utf-8"?>
 <ds:datastoreItem xmlns:ds="http://schemas.openxmlformats.org/officeDocument/2006/customXml" ds:itemID="{1862FBFE-0CF9-4FEB-A4AD-01F27F7B2B28}">
   <ds:schemaRefs>
     <ds:schemaRef ds:uri="230e9df3-be65-4c73-a93b-d1236ebd677e"/>
@@ -7484,14 +7486,6 @@
     <ds:schemaRef ds:uri="http://schemas.microsoft.com/sharepoint/v3"/>
     <ds:schemaRef ds:uri="http://schemas.openxmlformats.org/package/2006/metadata/core-properties"/>
     <ds:schemaRef ds:uri="http://www.w3.org/2001/XMLSchema"/>
-  </ds:schemaRefs>
-</ds:datastoreItem>
-</file>
-
-<file path=customXml/itemProps2.xml><?xml version="1.0" encoding="utf-8"?>
-<ds:datastoreItem xmlns:ds="http://schemas.openxmlformats.org/officeDocument/2006/customXml" ds:itemID="{113220A2-EEC3-42C6-B708-AF5124D23717}">
-  <ds:schemaRefs>
-    <ds:schemaRef ds:uri="http://schemas.microsoft.com/sharepoint/v3/contenttype/forms"/>
   </ds:schemaRefs>
 </ds:datastoreItem>
 </file>

</xml_diff>